<commit_message>
Dernier modif contenu du rapport
</commit_message>
<xml_diff>
--- a/Rendu/DiapoPourSoutenance.pptx
+++ b/Rendu/DiapoPourSoutenance.pptx
@@ -13374,36 +13374,6 @@
           </a:p>
         </p:txBody>
       </p:sp>
-      <p:pic>
-        <p:nvPicPr>
-          <p:cNvPr id="12" name="Image 11">
-            <a:extLst>
-              <a:ext uri="{FF2B5EF4-FFF2-40B4-BE49-F238E27FC236}">
-                <a16:creationId xmlns:a16="http://schemas.microsoft.com/office/drawing/2014/main" xmlns="" id="{37FE2C16-6DDB-4637-AD73-4672AA31B2A9}"/>
-              </a:ext>
-            </a:extLst>
-          </p:cNvPr>
-          <p:cNvPicPr>
-            <a:picLocks noChangeAspect="1"/>
-          </p:cNvPicPr>
-          <p:nvPr/>
-        </p:nvPicPr>
-        <p:blipFill>
-          <a:blip r:embed="rId8" cstate="print"/>
-          <a:stretch>
-            <a:fillRect/>
-          </a:stretch>
-        </p:blipFill>
-        <p:spPr>
-          <a:xfrm>
-            <a:off x="3613032" y="1523281"/>
-            <a:ext cx="8335747" cy="4534596"/>
-          </a:xfrm>
-          <a:prstGeom prst="rect">
-            <a:avLst/>
-          </a:prstGeom>
-        </p:spPr>
-      </p:pic>
       <p:sp>
         <p:nvSpPr>
           <p:cNvPr id="13" name="Rectangle 12">
@@ -13418,7 +13388,7 @@
         </p:nvSpPr>
         <p:spPr>
           <a:xfrm>
-            <a:off x="3791824" y="5735372"/>
+            <a:off x="3708699" y="5801872"/>
             <a:ext cx="8156955" cy="707886"/>
           </a:xfrm>
           <a:prstGeom prst="rect">
@@ -13463,6 +13433,39 @@
           </a:p>
         </p:txBody>
       </p:sp>
+      <p:pic>
+        <p:nvPicPr>
+          <p:cNvPr id="1028" name="Picture 4"/>
+          <p:cNvPicPr>
+            <a:picLocks noChangeAspect="1" noChangeArrowheads="1"/>
+          </p:cNvPicPr>
+          <p:nvPr/>
+        </p:nvPicPr>
+        <p:blipFill>
+          <a:blip r:embed="rId8" cstate="print"/>
+          <a:srcRect/>
+          <a:stretch>
+            <a:fillRect/>
+          </a:stretch>
+        </p:blipFill>
+        <p:spPr bwMode="auto">
+          <a:xfrm>
+            <a:off x="3275215" y="1321150"/>
+            <a:ext cx="8733904" cy="4744716"/>
+          </a:xfrm>
+          <a:prstGeom prst="rect">
+            <a:avLst/>
+          </a:prstGeom>
+          <a:noFill/>
+          <a:ln w="9525">
+            <a:noFill/>
+            <a:miter lim="800000"/>
+            <a:headEnd/>
+            <a:tailEnd/>
+          </a:ln>
+          <a:effectLst/>
+        </p:spPr>
+      </p:pic>
     </p:spTree>
     <p:extLst>
       <p:ext uri="{BB962C8B-B14F-4D97-AF65-F5344CB8AC3E}">

</xml_diff>